<commit_message>
JSON input card functionality
Former-commit-id: 4c6872bdd3613daf91f6f3117edc3ea29c38bb87 [formerly f7e6f2c53e59c6cae758cda4bf450f5f17f70708]
Former-commit-id: a5d6cfe66cb2de08be5f1daf043430efd8037752
</commit_message>
<xml_diff>
--- a/talks/xx-xx-2021-update.pptx
+++ b/talks/xx-xx-2021-update.pptx
@@ -107,6 +107,11 @@
       </a:defRPr>
     </a:lvl9pPr>
   </p:defaultTextStyle>
+  <p:extLst>
+    <p:ext uri="{EFAFB233-063F-42B5-8137-9DF3F51BA10A}">
+      <p15:sldGuideLst xmlns:p15="http://schemas.microsoft.com/office/powerpoint/2012/main"/>
+    </p:ext>
+  </p:extLst>
 </p:presentation>
 </file>
 
@@ -259,7 +264,7 @@
           <a:p>
             <a:fld id="{CF15E749-5B45-8448-9710-CF91B24D837F}" type="datetimeFigureOut">
               <a:rPr lang="en-NL" smtClean="0"/>
-              <a:t>25/01/2021</a:t>
+              <a:t>26/01/2021</a:t>
             </a:fld>
             <a:endParaRPr lang="en-NL"/>
           </a:p>
@@ -459,7 +464,7 @@
           <a:p>
             <a:fld id="{CF15E749-5B45-8448-9710-CF91B24D837F}" type="datetimeFigureOut">
               <a:rPr lang="en-NL" smtClean="0"/>
-              <a:t>25/01/2021</a:t>
+              <a:t>26/01/2021</a:t>
             </a:fld>
             <a:endParaRPr lang="en-NL"/>
           </a:p>
@@ -669,7 +674,7 @@
           <a:p>
             <a:fld id="{CF15E749-5B45-8448-9710-CF91B24D837F}" type="datetimeFigureOut">
               <a:rPr lang="en-NL" smtClean="0"/>
-              <a:t>25/01/2021</a:t>
+              <a:t>26/01/2021</a:t>
             </a:fld>
             <a:endParaRPr lang="en-NL"/>
           </a:p>
@@ -869,7 +874,7 @@
           <a:p>
             <a:fld id="{CF15E749-5B45-8448-9710-CF91B24D837F}" type="datetimeFigureOut">
               <a:rPr lang="en-NL" smtClean="0"/>
-              <a:t>25/01/2021</a:t>
+              <a:t>26/01/2021</a:t>
             </a:fld>
             <a:endParaRPr lang="en-NL"/>
           </a:p>
@@ -1145,7 +1150,7 @@
           <a:p>
             <a:fld id="{CF15E749-5B45-8448-9710-CF91B24D837F}" type="datetimeFigureOut">
               <a:rPr lang="en-NL" smtClean="0"/>
-              <a:t>25/01/2021</a:t>
+              <a:t>26/01/2021</a:t>
             </a:fld>
             <a:endParaRPr lang="en-NL"/>
           </a:p>
@@ -1413,7 +1418,7 @@
           <a:p>
             <a:fld id="{CF15E749-5B45-8448-9710-CF91B24D837F}" type="datetimeFigureOut">
               <a:rPr lang="en-NL" smtClean="0"/>
-              <a:t>25/01/2021</a:t>
+              <a:t>26/01/2021</a:t>
             </a:fld>
             <a:endParaRPr lang="en-NL"/>
           </a:p>
@@ -1828,7 +1833,7 @@
           <a:p>
             <a:fld id="{CF15E749-5B45-8448-9710-CF91B24D837F}" type="datetimeFigureOut">
               <a:rPr lang="en-NL" smtClean="0"/>
-              <a:t>25/01/2021</a:t>
+              <a:t>26/01/2021</a:t>
             </a:fld>
             <a:endParaRPr lang="en-NL"/>
           </a:p>
@@ -1970,7 +1975,7 @@
           <a:p>
             <a:fld id="{CF15E749-5B45-8448-9710-CF91B24D837F}" type="datetimeFigureOut">
               <a:rPr lang="en-NL" smtClean="0"/>
-              <a:t>25/01/2021</a:t>
+              <a:t>26/01/2021</a:t>
             </a:fld>
             <a:endParaRPr lang="en-NL"/>
           </a:p>
@@ -2083,7 +2088,7 @@
           <a:p>
             <a:fld id="{CF15E749-5B45-8448-9710-CF91B24D837F}" type="datetimeFigureOut">
               <a:rPr lang="en-NL" smtClean="0"/>
-              <a:t>25/01/2021</a:t>
+              <a:t>26/01/2021</a:t>
             </a:fld>
             <a:endParaRPr lang="en-NL"/>
           </a:p>
@@ -2396,7 +2401,7 @@
           <a:p>
             <a:fld id="{CF15E749-5B45-8448-9710-CF91B24D837F}" type="datetimeFigureOut">
               <a:rPr lang="en-NL" smtClean="0"/>
-              <a:t>25/01/2021</a:t>
+              <a:t>26/01/2021</a:t>
             </a:fld>
             <a:endParaRPr lang="en-NL"/>
           </a:p>
@@ -2685,7 +2690,7 @@
           <a:p>
             <a:fld id="{CF15E749-5B45-8448-9710-CF91B24D837F}" type="datetimeFigureOut">
               <a:rPr lang="en-NL" smtClean="0"/>
-              <a:t>25/01/2021</a:t>
+              <a:t>26/01/2021</a:t>
             </a:fld>
             <a:endParaRPr lang="en-NL"/>
           </a:p>
@@ -2928,7 +2933,7 @@
           <a:p>
             <a:fld id="{CF15E749-5B45-8448-9710-CF91B24D837F}" type="datetimeFigureOut">
               <a:rPr lang="en-NL" smtClean="0"/>
-              <a:t>25/01/2021</a:t>
+              <a:t>26/01/2021</a:t>
             </a:fld>
             <a:endParaRPr lang="en-NL"/>
           </a:p>

</xml_diff>